<commit_message>
File updates for reg form
</commit_message>
<xml_diff>
--- a/Presentations/Proposal.pptx
+++ b/Presentations/Proposal.pptx
@@ -473,11 +473,11 @@
           <c:showPercent val="0"/>
           <c:showBubbleSize val="0"/>
         </c:dLbls>
-        <c:axId val="816493936"/>
-        <c:axId val="744293232"/>
+        <c:axId val="870903952"/>
+        <c:axId val="815526528"/>
       </c:scatterChart>
       <c:valAx>
-        <c:axId val="816493936"/>
+        <c:axId val="870903952"/>
         <c:scaling>
           <c:orientation val="minMax"/>
         </c:scaling>
@@ -620,12 +620,12 @@
             <a:endParaRPr lang="en-US"/>
           </a:p>
         </c:txPr>
-        <c:crossAx val="744293232"/>
+        <c:crossAx val="815526528"/>
         <c:crosses val="autoZero"/>
         <c:crossBetween val="midCat"/>
       </c:valAx>
       <c:valAx>
-        <c:axId val="744293232"/>
+        <c:axId val="815526528"/>
         <c:scaling>
           <c:orientation val="minMax"/>
         </c:scaling>
@@ -773,7 +773,7 @@
             <a:endParaRPr lang="en-US"/>
           </a:p>
         </c:txPr>
-        <c:crossAx val="816493936"/>
+        <c:crossAx val="870903952"/>
         <c:crosses val="autoZero"/>
         <c:crossBetween val="midCat"/>
       </c:valAx>
@@ -1504,7 +1504,7 @@
           <a:p>
             <a:fld id="{74BB652D-7810-496D-A2FA-D61220BB4334}" type="datetime4">
               <a:rPr lang="de-DE" smtClean="0"/>
-              <a:t>19. January 2017</a:t>
+              <a:t>23. January 2017</a:t>
             </a:fld>
             <a:endParaRPr lang="de-DE"/>
           </a:p>
@@ -1887,7 +1887,7 @@
           <a:p>
             <a:fld id="{BEF970E4-9540-437D-B70A-0A41E70CE984}" type="datetime4">
               <a:rPr lang="de-DE" smtClean="0"/>
-              <a:t>19. January 2017</a:t>
+              <a:t>23. January 2017</a:t>
             </a:fld>
             <a:endParaRPr lang="de-DE"/>
           </a:p>
@@ -2529,7 +2529,7 @@
           <a:p>
             <a:fld id="{BEF970E4-9540-437D-B70A-0A41E70CE984}" type="datetime4">
               <a:rPr lang="de-DE" smtClean="0"/>
-              <a:t>19. January 2017</a:t>
+              <a:t>23. January 2017</a:t>
             </a:fld>
             <a:endParaRPr lang="de-DE"/>
           </a:p>
@@ -2648,6 +2648,163 @@
           <a:bodyPr/>
           <a:lstStyle/>
           <a:p>
+            <a:pPr marL="358775" lvl="2" indent="0">
+              <a:buFont typeface="Arial" charset="0"/>
+              <a:buNone/>
+            </a:pPr>
+            <a:r>
+              <a:rPr lang="en-US" sz="1200" b="0" i="0" kern="1200" dirty="0" smtClean="0">
+                <a:solidFill>
+                  <a:schemeClr val="tx1"/>
+                </a:solidFill>
+                <a:effectLst/>
+                <a:latin typeface="Bitstream Charter" pitchFamily="2" charset="0"/>
+                <a:ea typeface="+mn-ea"/>
+                <a:cs typeface="+mn-cs"/>
+              </a:rPr>
+              <a:t>Memory </a:t>
+            </a:r>
+            <a:r>
+              <a:rPr lang="en-US" sz="1200" b="0" i="0" kern="1200" dirty="0" err="1" smtClean="0">
+                <a:solidFill>
+                  <a:schemeClr val="tx1"/>
+                </a:solidFill>
+                <a:effectLst/>
+                <a:latin typeface="Bitstream Charter" pitchFamily="2" charset="0"/>
+                <a:ea typeface="+mn-ea"/>
+                <a:cs typeface="+mn-cs"/>
+              </a:rPr>
+              <a:t>Hiding:memory</a:t>
+            </a:r>
+            <a:r>
+              <a:rPr lang="en-US" sz="1200" b="0" i="0" kern="1200" dirty="0" smtClean="0">
+                <a:solidFill>
+                  <a:schemeClr val="tx1"/>
+                </a:solidFill>
+                <a:effectLst/>
+                <a:latin typeface="Bitstream Charter" pitchFamily="2" charset="0"/>
+                <a:ea typeface="+mn-ea"/>
+                <a:cs typeface="+mn-cs"/>
+              </a:rPr>
+              <a:t> access time is 'hidden' by executing other instructions whilst waiting for the memory access</a:t>
+            </a:r>
+            <a:endParaRPr lang="en-US" dirty="0" smtClean="0"/>
+          </a:p>
+          <a:p>
+            <a:pPr marL="701675" lvl="2" indent="-342900">
+              <a:buFont typeface="Arial" charset="0"/>
+              <a:buChar char="•"/>
+            </a:pPr>
+            <a:endParaRPr lang="en-US" dirty="0" smtClean="0"/>
+          </a:p>
+          <a:p>
+            <a:pPr marL="701675" lvl="2" indent="-342900">
+              <a:buFont typeface="Arial" charset="0"/>
+              <a:buChar char="•"/>
+            </a:pPr>
+            <a:r>
+              <a:rPr lang="en-US" dirty="0" smtClean="0"/>
+              <a:t>Enhancing </a:t>
+            </a:r>
+            <a:r>
+              <a:rPr lang="en-US" dirty="0" smtClean="0"/>
+              <a:t>the application memory access regularity</a:t>
+            </a:r>
+          </a:p>
+          <a:p>
+            <a:pPr marL="881062" lvl="3" indent="-342900">
+              <a:buFont typeface="Arial" charset="0"/>
+              <a:buChar char="•"/>
+            </a:pPr>
+            <a:r>
+              <a:rPr lang="en-US" dirty="0" smtClean="0"/>
+              <a:t>To help hardware </a:t>
+            </a:r>
+            <a:r>
+              <a:rPr lang="en-US" dirty="0" err="1" smtClean="0"/>
+              <a:t>prefetcher</a:t>
+            </a:r>
+            <a:endParaRPr lang="en-US" dirty="0" smtClean="0"/>
+          </a:p>
+          <a:p>
+            <a:pPr marL="701675" lvl="2" indent="-342900">
+              <a:buFont typeface="Arial" charset="0"/>
+              <a:buChar char="•"/>
+            </a:pPr>
+            <a:r>
+              <a:rPr lang="en-US" dirty="0" smtClean="0"/>
+              <a:t>Enhancing spatial locality </a:t>
+            </a:r>
+          </a:p>
+          <a:p>
+            <a:pPr marL="881062" lvl="3" indent="-342900">
+              <a:buFont typeface="Arial" charset="0"/>
+              <a:buChar char="•"/>
+            </a:pPr>
+            <a:r>
+              <a:rPr lang="en-US" dirty="0" smtClean="0"/>
+              <a:t>To help minimize the amount of unused data transferred between memory and cache</a:t>
+            </a:r>
+          </a:p>
+          <a:p>
+            <a:pPr marL="881062" lvl="3" indent="-342900">
+              <a:buFont typeface="Arial" charset="0"/>
+              <a:buChar char="•"/>
+            </a:pPr>
+            <a:r>
+              <a:rPr lang="en-US" dirty="0" smtClean="0"/>
+              <a:t>Minimize the amount of cache space occupied by unused data</a:t>
+            </a:r>
+          </a:p>
+          <a:p>
+            <a:pPr marL="701675" lvl="2" indent="-342900">
+              <a:buFont typeface="Arial" charset="0"/>
+              <a:buChar char="•"/>
+            </a:pPr>
+            <a:r>
+              <a:rPr lang="en-US" dirty="0" smtClean="0"/>
+              <a:t>Enhancing temporal locality</a:t>
+            </a:r>
+          </a:p>
+          <a:p>
+            <a:pPr marL="881062" lvl="3" indent="-342900">
+              <a:buFont typeface="Arial" charset="0"/>
+              <a:buChar char="•"/>
+            </a:pPr>
+            <a:r>
+              <a:rPr lang="en-US" dirty="0" smtClean="0"/>
+              <a:t>By suggesting ways to reuse data while it remains in the cache</a:t>
+            </a:r>
+          </a:p>
+          <a:p>
+            <a:pPr marL="701675" lvl="2" indent="-342900">
+              <a:buFont typeface="Arial" charset="0"/>
+              <a:buChar char="•"/>
+            </a:pPr>
+            <a:r>
+              <a:rPr lang="en-US" dirty="0" smtClean="0"/>
+              <a:t>Hide memory access</a:t>
+            </a:r>
+          </a:p>
+          <a:p>
+            <a:pPr marL="881062" lvl="3" indent="-342900">
+              <a:buFont typeface="Arial" charset="0"/>
+              <a:buChar char="•"/>
+            </a:pPr>
+            <a:r>
+              <a:rPr lang="en-US" dirty="0" smtClean="0"/>
+              <a:t>By adding </a:t>
+            </a:r>
+            <a:r>
+              <a:rPr lang="en-US" dirty="0" err="1" smtClean="0"/>
+              <a:t>prefetch</a:t>
+            </a:r>
+            <a:r>
+              <a:rPr lang="en-US" dirty="0" smtClean="0"/>
+              <a:t> instructions</a:t>
+            </a:r>
+          </a:p>
+          <a:p>
             <a:endParaRPr lang="en-US" dirty="0"/>
           </a:p>
         </p:txBody>
@@ -2669,7 +2826,7 @@
           <a:p>
             <a:fld id="{BEF970E4-9540-437D-B70A-0A41E70CE984}" type="datetime4">
               <a:rPr lang="de-DE" smtClean="0"/>
-              <a:t>19. January 2017</a:t>
+              <a:t>23. January 2017</a:t>
             </a:fld>
             <a:endParaRPr lang="de-DE"/>
           </a:p>
@@ -2720,7 +2877,7 @@
             <a:fld id="{C36AA9A4-5D0B-4134-89A6-D8B9DAA4F25C}" type="slidenum">
               <a:rPr lang="de-DE" smtClean="0"/>
               <a:pPr/>
-              <a:t>14</a:t>
+              <a:t>13</a:t>
             </a:fld>
             <a:endParaRPr lang="de-DE"/>
           </a:p>
@@ -2729,7 +2886,7 @@
     </p:spTree>
     <p:extLst>
       <p:ext uri="{BB962C8B-B14F-4D97-AF65-F5344CB8AC3E}">
-        <p14:creationId xmlns:p14="http://schemas.microsoft.com/office/powerpoint/2010/main" val="194738249"/>
+        <p14:creationId xmlns:p14="http://schemas.microsoft.com/office/powerpoint/2010/main" val="856152240"/>
       </p:ext>
     </p:extLst>
   </p:cSld>
@@ -2788,93 +2945,6 @@
           <a:bodyPr/>
           <a:lstStyle/>
           <a:p>
-            <a:pPr marL="701675" lvl="2" indent="-342900">
-              <a:buFont typeface="Arial" charset="0"/>
-              <a:buChar char="•"/>
-            </a:pPr>
-            <a:r>
-              <a:rPr lang="en-US" dirty="0" smtClean="0"/>
-              <a:t>OS: The mapping performed by the operating system </a:t>
-            </a:r>
-          </a:p>
-          <a:p>
-            <a:pPr marL="701675" lvl="2" indent="-342900">
-              <a:buFont typeface="Arial" charset="0"/>
-              <a:buChar char="•"/>
-            </a:pPr>
-            <a:r>
-              <a:rPr lang="en-US" dirty="0" smtClean="0"/>
-              <a:t>Compact: Performs a round-robin scheduling of threads to PUs </a:t>
-            </a:r>
-          </a:p>
-          <a:p>
-            <a:pPr marL="881062" lvl="3" indent="-342900">
-              <a:buFont typeface="Arial" charset="0"/>
-              <a:buChar char="•"/>
-            </a:pPr>
-            <a:r>
-              <a:rPr lang="en-US" dirty="0" smtClean="0"/>
-              <a:t>Neighboring threads are placed close to each other in the memory hierarchy </a:t>
-            </a:r>
-          </a:p>
-          <a:p>
-            <a:pPr marL="701675" lvl="2" indent="-342900">
-              <a:buFont typeface="Arial" charset="0"/>
-              <a:buChar char="•"/>
-            </a:pPr>
-            <a:r>
-              <a:rPr lang="en-US" dirty="0" smtClean="0"/>
-              <a:t>Scatter: Represents the opposite of Compact </a:t>
-            </a:r>
-          </a:p>
-          <a:p>
-            <a:pPr marL="881062" lvl="3" indent="-342900">
-              <a:buFont typeface="Arial" charset="0"/>
-              <a:buChar char="•"/>
-            </a:pPr>
-            <a:r>
-              <a:rPr lang="en-US" dirty="0" smtClean="0"/>
-              <a:t>Neighboring threads are placed far from each other in the hierarchy </a:t>
-            </a:r>
-          </a:p>
-          <a:p>
-            <a:pPr marL="701675" lvl="2" indent="-342900">
-              <a:buFont typeface="Arial" charset="0"/>
-              <a:buChar char="•"/>
-            </a:pPr>
-            <a:r>
-              <a:rPr lang="en-US" dirty="0" smtClean="0"/>
-              <a:t>Locality: Mapping threads that communicate frequently close to each other in the memory hierarchy </a:t>
-            </a:r>
-          </a:p>
-          <a:p>
-            <a:pPr marL="881062" lvl="3" indent="-342900">
-              <a:buFont typeface="Arial" charset="0"/>
-              <a:buChar char="•"/>
-            </a:pPr>
-            <a:r>
-              <a:rPr lang="en-US" dirty="0" smtClean="0"/>
-              <a:t>Different algorithms e.g., Matrices</a:t>
-            </a:r>
-          </a:p>
-          <a:p>
-            <a:pPr marL="701675" lvl="2" indent="-342900">
-              <a:buFont typeface="Arial" charset="0"/>
-              <a:buChar char="•"/>
-            </a:pPr>
-            <a:r>
-              <a:rPr lang="en-US" dirty="0" smtClean="0"/>
-              <a:t>Distance: Represents the opposite of Locality, placing threads that communicate far apart in the memory hierarchy </a:t>
-            </a:r>
-          </a:p>
-          <a:p>
-            <a:pPr marL="701675" lvl="2" indent="-342900">
-              <a:buFont typeface="Arial" charset="0"/>
-              <a:buChar char="•"/>
-            </a:pPr>
-            <a:endParaRPr lang="en-US" dirty="0" smtClean="0"/>
-          </a:p>
-          <a:p>
             <a:endParaRPr lang="en-US" dirty="0"/>
           </a:p>
         </p:txBody>
@@ -2896,7 +2966,7 @@
           <a:p>
             <a:fld id="{BEF970E4-9540-437D-B70A-0A41E70CE984}" type="datetime4">
               <a:rPr lang="de-DE" smtClean="0"/>
-              <a:t>19. January 2017</a:t>
+              <a:t>23. January 2017</a:t>
             </a:fld>
             <a:endParaRPr lang="de-DE"/>
           </a:p>
@@ -2947,7 +3017,7 @@
             <a:fld id="{C36AA9A4-5D0B-4134-89A6-D8B9DAA4F25C}" type="slidenum">
               <a:rPr lang="de-DE" smtClean="0"/>
               <a:pPr/>
-              <a:t>15</a:t>
+              <a:t>14</a:t>
             </a:fld>
             <a:endParaRPr lang="de-DE"/>
           </a:p>
@@ -2956,7 +3026,7 @@
     </p:spTree>
     <p:extLst>
       <p:ext uri="{BB962C8B-B14F-4D97-AF65-F5344CB8AC3E}">
-        <p14:creationId xmlns:p14="http://schemas.microsoft.com/office/powerpoint/2010/main" val="2098755093"/>
+        <p14:creationId xmlns:p14="http://schemas.microsoft.com/office/powerpoint/2010/main" val="194738249"/>
       </p:ext>
     </p:extLst>
   </p:cSld>
@@ -3015,6 +3085,93 @@
           <a:bodyPr/>
           <a:lstStyle/>
           <a:p>
+            <a:pPr marL="701675" lvl="2" indent="-342900">
+              <a:buFont typeface="Arial" charset="0"/>
+              <a:buChar char="•"/>
+            </a:pPr>
+            <a:r>
+              <a:rPr lang="en-US" dirty="0" smtClean="0"/>
+              <a:t>OS: The mapping performed by the operating system </a:t>
+            </a:r>
+          </a:p>
+          <a:p>
+            <a:pPr marL="701675" lvl="2" indent="-342900">
+              <a:buFont typeface="Arial" charset="0"/>
+              <a:buChar char="•"/>
+            </a:pPr>
+            <a:r>
+              <a:rPr lang="en-US" dirty="0" smtClean="0"/>
+              <a:t>Compact: Performs a round-robin scheduling of threads to PUs </a:t>
+            </a:r>
+          </a:p>
+          <a:p>
+            <a:pPr marL="881062" lvl="3" indent="-342900">
+              <a:buFont typeface="Arial" charset="0"/>
+              <a:buChar char="•"/>
+            </a:pPr>
+            <a:r>
+              <a:rPr lang="en-US" dirty="0" smtClean="0"/>
+              <a:t>Neighboring threads are placed close to each other in the memory hierarchy </a:t>
+            </a:r>
+          </a:p>
+          <a:p>
+            <a:pPr marL="701675" lvl="2" indent="-342900">
+              <a:buFont typeface="Arial" charset="0"/>
+              <a:buChar char="•"/>
+            </a:pPr>
+            <a:r>
+              <a:rPr lang="en-US" dirty="0" smtClean="0"/>
+              <a:t>Scatter: Represents the opposite of Compact </a:t>
+            </a:r>
+          </a:p>
+          <a:p>
+            <a:pPr marL="881062" lvl="3" indent="-342900">
+              <a:buFont typeface="Arial" charset="0"/>
+              <a:buChar char="•"/>
+            </a:pPr>
+            <a:r>
+              <a:rPr lang="en-US" dirty="0" smtClean="0"/>
+              <a:t>Neighboring threads are placed far from each other in the hierarchy </a:t>
+            </a:r>
+          </a:p>
+          <a:p>
+            <a:pPr marL="701675" lvl="2" indent="-342900">
+              <a:buFont typeface="Arial" charset="0"/>
+              <a:buChar char="•"/>
+            </a:pPr>
+            <a:r>
+              <a:rPr lang="en-US" dirty="0" smtClean="0"/>
+              <a:t>Locality: Mapping threads that communicate frequently close to each other in the memory hierarchy </a:t>
+            </a:r>
+          </a:p>
+          <a:p>
+            <a:pPr marL="881062" lvl="3" indent="-342900">
+              <a:buFont typeface="Arial" charset="0"/>
+              <a:buChar char="•"/>
+            </a:pPr>
+            <a:r>
+              <a:rPr lang="en-US" dirty="0" smtClean="0"/>
+              <a:t>Different algorithms e.g., Matrices</a:t>
+            </a:r>
+          </a:p>
+          <a:p>
+            <a:pPr marL="701675" lvl="2" indent="-342900">
+              <a:buFont typeface="Arial" charset="0"/>
+              <a:buChar char="•"/>
+            </a:pPr>
+            <a:r>
+              <a:rPr lang="en-US" dirty="0" smtClean="0"/>
+              <a:t>Distance: Represents the opposite of Locality, placing threads that communicate far apart in the memory hierarchy </a:t>
+            </a:r>
+          </a:p>
+          <a:p>
+            <a:pPr marL="701675" lvl="2" indent="-342900">
+              <a:buFont typeface="Arial" charset="0"/>
+              <a:buChar char="•"/>
+            </a:pPr>
+            <a:endParaRPr lang="en-US" dirty="0" smtClean="0"/>
+          </a:p>
+          <a:p>
             <a:endParaRPr lang="en-US" dirty="0"/>
           </a:p>
         </p:txBody>
@@ -3036,7 +3193,7 @@
           <a:p>
             <a:fld id="{BEF970E4-9540-437D-B70A-0A41E70CE984}" type="datetime4">
               <a:rPr lang="de-DE" smtClean="0"/>
-              <a:t>19. January 2017</a:t>
+              <a:t>23. January 2017</a:t>
             </a:fld>
             <a:endParaRPr lang="de-DE"/>
           </a:p>
@@ -3087,7 +3244,7 @@
             <a:fld id="{C36AA9A4-5D0B-4134-89A6-D8B9DAA4F25C}" type="slidenum">
               <a:rPr lang="de-DE" smtClean="0"/>
               <a:pPr/>
-              <a:t>16</a:t>
+              <a:t>15</a:t>
             </a:fld>
             <a:endParaRPr lang="de-DE"/>
           </a:p>
@@ -3096,7 +3253,7 @@
     </p:spTree>
     <p:extLst>
       <p:ext uri="{BB962C8B-B14F-4D97-AF65-F5344CB8AC3E}">
-        <p14:creationId xmlns:p14="http://schemas.microsoft.com/office/powerpoint/2010/main" val="1719715303"/>
+        <p14:creationId xmlns:p14="http://schemas.microsoft.com/office/powerpoint/2010/main" val="2098755093"/>
       </p:ext>
     </p:extLst>
   </p:cSld>
@@ -3176,7 +3333,7 @@
           <a:p>
             <a:fld id="{BEF970E4-9540-437D-B70A-0A41E70CE984}" type="datetime4">
               <a:rPr lang="de-DE" smtClean="0"/>
-              <a:t>19. January 2017</a:t>
+              <a:t>23. January 2017</a:t>
             </a:fld>
             <a:endParaRPr lang="de-DE"/>
           </a:p>
@@ -3198,9 +3355,10 @@
           <a:lstStyle/>
           <a:p>
             <a:r>
-              <a:rPr lang="de-DE"/>
+              <a:rPr lang="de-DE" smtClean="0"/>
               <a:t>|  </a:t>
             </a:r>
+            <a:endParaRPr lang="de-DE"/>
           </a:p>
         </p:txBody>
       </p:sp>
@@ -3220,13 +3378,13 @@
           <a:lstStyle/>
           <a:p>
             <a:r>
-              <a:rPr lang="de-DE"/>
+              <a:rPr lang="de-DE" smtClean="0"/>
               <a:t>|  </a:t>
             </a:r>
             <a:fld id="{C36AA9A4-5D0B-4134-89A6-D8B9DAA4F25C}" type="slidenum">
               <a:rPr lang="de-DE" smtClean="0"/>
               <a:pPr/>
-              <a:t>18</a:t>
+              <a:t>16</a:t>
             </a:fld>
             <a:endParaRPr lang="de-DE"/>
           </a:p>
@@ -3235,7 +3393,7 @@
     </p:spTree>
     <p:extLst>
       <p:ext uri="{BB962C8B-B14F-4D97-AF65-F5344CB8AC3E}">
-        <p14:creationId xmlns:p14="http://schemas.microsoft.com/office/powerpoint/2010/main" val="1865772737"/>
+        <p14:creationId xmlns:p14="http://schemas.microsoft.com/office/powerpoint/2010/main" val="1719715303"/>
       </p:ext>
     </p:extLst>
   </p:cSld>
@@ -3315,7 +3473,7 @@
           <a:p>
             <a:fld id="{BEF970E4-9540-437D-B70A-0A41E70CE984}" type="datetime4">
               <a:rPr lang="de-DE" smtClean="0"/>
-              <a:t>19. January 2017</a:t>
+              <a:t>23. January 2017</a:t>
             </a:fld>
             <a:endParaRPr lang="de-DE"/>
           </a:p>
@@ -3337,10 +3495,9 @@
           <a:lstStyle/>
           <a:p>
             <a:r>
-              <a:rPr lang="de-DE" smtClean="0"/>
+              <a:rPr lang="de-DE"/>
               <a:t>|  </a:t>
             </a:r>
-            <a:endParaRPr lang="de-DE"/>
           </a:p>
         </p:txBody>
       </p:sp>
@@ -3360,13 +3517,13 @@
           <a:lstStyle/>
           <a:p>
             <a:r>
-              <a:rPr lang="de-DE" smtClean="0"/>
+              <a:rPr lang="de-DE"/>
               <a:t>|  </a:t>
             </a:r>
             <a:fld id="{C36AA9A4-5D0B-4134-89A6-D8B9DAA4F25C}" type="slidenum">
               <a:rPr lang="de-DE" smtClean="0"/>
               <a:pPr/>
-              <a:t>19</a:t>
+              <a:t>18</a:t>
             </a:fld>
             <a:endParaRPr lang="de-DE"/>
           </a:p>
@@ -3375,7 +3532,7 @@
     </p:spTree>
     <p:extLst>
       <p:ext uri="{BB962C8B-B14F-4D97-AF65-F5344CB8AC3E}">
-        <p14:creationId xmlns:p14="http://schemas.microsoft.com/office/powerpoint/2010/main" val="1744293244"/>
+        <p14:creationId xmlns:p14="http://schemas.microsoft.com/office/powerpoint/2010/main" val="1865772737"/>
       </p:ext>
     </p:extLst>
   </p:cSld>
@@ -3455,7 +3612,7 @@
           <a:p>
             <a:fld id="{BEF970E4-9540-437D-B70A-0A41E70CE984}" type="datetime4">
               <a:rPr lang="de-DE" smtClean="0"/>
-              <a:t>19. January 2017</a:t>
+              <a:t>23. January 2017</a:t>
             </a:fld>
             <a:endParaRPr lang="de-DE"/>
           </a:p>
@@ -3477,9 +3634,10 @@
           <a:lstStyle/>
           <a:p>
             <a:r>
-              <a:rPr lang="de-DE"/>
+              <a:rPr lang="de-DE" smtClean="0"/>
               <a:t>|  </a:t>
             </a:r>
+            <a:endParaRPr lang="de-DE"/>
           </a:p>
         </p:txBody>
       </p:sp>
@@ -3499,13 +3657,13 @@
           <a:lstStyle/>
           <a:p>
             <a:r>
-              <a:rPr lang="de-DE"/>
+              <a:rPr lang="de-DE" smtClean="0"/>
               <a:t>|  </a:t>
             </a:r>
             <a:fld id="{C36AA9A4-5D0B-4134-89A6-D8B9DAA4F25C}" type="slidenum">
               <a:rPr lang="de-DE" smtClean="0"/>
               <a:pPr/>
-              <a:t>20</a:t>
+              <a:t>19</a:t>
             </a:fld>
             <a:endParaRPr lang="de-DE"/>
           </a:p>
@@ -3514,7 +3672,7 @@
     </p:spTree>
     <p:extLst>
       <p:ext uri="{BB962C8B-B14F-4D97-AF65-F5344CB8AC3E}">
-        <p14:creationId xmlns:p14="http://schemas.microsoft.com/office/powerpoint/2010/main" val="1301839886"/>
+        <p14:creationId xmlns:p14="http://schemas.microsoft.com/office/powerpoint/2010/main" val="1744293244"/>
       </p:ext>
     </p:extLst>
   </p:cSld>
@@ -3573,7 +3731,7 @@
           <a:bodyPr/>
           <a:lstStyle/>
           <a:p>
-            <a:endParaRPr lang="en-US"/>
+            <a:endParaRPr lang="en-US" dirty="0"/>
           </a:p>
         </p:txBody>
       </p:sp>
@@ -3594,7 +3752,7 @@
           <a:p>
             <a:fld id="{BEF970E4-9540-437D-B70A-0A41E70CE984}" type="datetime4">
               <a:rPr lang="de-DE" smtClean="0"/>
-              <a:t>19. January 2017</a:t>
+              <a:t>23. January 2017</a:t>
             </a:fld>
             <a:endParaRPr lang="de-DE"/>
           </a:p>
@@ -3616,10 +3774,9 @@
           <a:lstStyle/>
           <a:p>
             <a:r>
-              <a:rPr lang="de-DE" smtClean="0"/>
+              <a:rPr lang="de-DE"/>
               <a:t>|  </a:t>
             </a:r>
-            <a:endParaRPr lang="de-DE"/>
           </a:p>
         </p:txBody>
       </p:sp>
@@ -3639,13 +3796,13 @@
           <a:lstStyle/>
           <a:p>
             <a:r>
-              <a:rPr lang="de-DE" smtClean="0"/>
+              <a:rPr lang="de-DE"/>
               <a:t>|  </a:t>
             </a:r>
             <a:fld id="{C36AA9A4-5D0B-4134-89A6-D8B9DAA4F25C}" type="slidenum">
               <a:rPr lang="de-DE" smtClean="0"/>
               <a:pPr/>
-              <a:t>21</a:t>
+              <a:t>20</a:t>
             </a:fld>
             <a:endParaRPr lang="de-DE"/>
           </a:p>
@@ -3654,7 +3811,7 @@
     </p:spTree>
     <p:extLst>
       <p:ext uri="{BB962C8B-B14F-4D97-AF65-F5344CB8AC3E}">
-        <p14:creationId xmlns:p14="http://schemas.microsoft.com/office/powerpoint/2010/main" val="405505431"/>
+        <p14:creationId xmlns:p14="http://schemas.microsoft.com/office/powerpoint/2010/main" val="1301839886"/>
       </p:ext>
     </p:extLst>
   </p:cSld>
@@ -3713,11 +3870,7 @@
           <a:bodyPr/>
           <a:lstStyle/>
           <a:p>
-            <a:r>
-              <a:rPr lang="en-US" dirty="0" smtClean="0"/>
-              <a:t>Change the color of photo</a:t>
-            </a:r>
-            <a:endParaRPr lang="en-US" dirty="0"/>
+            <a:endParaRPr lang="en-US"/>
           </a:p>
         </p:txBody>
       </p:sp>
@@ -3738,7 +3891,7 @@
           <a:p>
             <a:fld id="{BEF970E4-9540-437D-B70A-0A41E70CE984}" type="datetime4">
               <a:rPr lang="de-DE" smtClean="0"/>
-              <a:t>19. January 2017</a:t>
+              <a:t>23. January 2017</a:t>
             </a:fld>
             <a:endParaRPr lang="de-DE"/>
           </a:p>
@@ -3760,9 +3913,10 @@
           <a:lstStyle/>
           <a:p>
             <a:r>
-              <a:rPr lang="de-DE"/>
+              <a:rPr lang="de-DE" smtClean="0"/>
               <a:t>|  </a:t>
             </a:r>
+            <a:endParaRPr lang="de-DE"/>
           </a:p>
         </p:txBody>
       </p:sp>
@@ -3782,13 +3936,13 @@
           <a:lstStyle/>
           <a:p>
             <a:r>
-              <a:rPr lang="de-DE"/>
+              <a:rPr lang="de-DE" smtClean="0"/>
               <a:t>|  </a:t>
             </a:r>
             <a:fld id="{C36AA9A4-5D0B-4134-89A6-D8B9DAA4F25C}" type="slidenum">
               <a:rPr lang="de-DE" smtClean="0"/>
               <a:pPr/>
-              <a:t>22</a:t>
+              <a:t>21</a:t>
             </a:fld>
             <a:endParaRPr lang="de-DE"/>
           </a:p>
@@ -3797,7 +3951,7 @@
     </p:spTree>
     <p:extLst>
       <p:ext uri="{BB962C8B-B14F-4D97-AF65-F5344CB8AC3E}">
-        <p14:creationId xmlns:p14="http://schemas.microsoft.com/office/powerpoint/2010/main" val="614719273"/>
+        <p14:creationId xmlns:p14="http://schemas.microsoft.com/office/powerpoint/2010/main" val="405505431"/>
       </p:ext>
     </p:extLst>
   </p:cSld>
@@ -3856,6 +4010,10 @@
           <a:bodyPr/>
           <a:lstStyle/>
           <a:p>
+            <a:r>
+              <a:rPr lang="en-US" dirty="0" smtClean="0"/>
+              <a:t>Change the color of photo</a:t>
+            </a:r>
             <a:endParaRPr lang="en-US" dirty="0"/>
           </a:p>
         </p:txBody>
@@ -3877,7 +4035,7 @@
           <a:p>
             <a:fld id="{BEF970E4-9540-437D-B70A-0A41E70CE984}" type="datetime4">
               <a:rPr lang="de-DE" smtClean="0"/>
-              <a:t>19. January 2017</a:t>
+              <a:t>23. January 2017</a:t>
             </a:fld>
             <a:endParaRPr lang="de-DE"/>
           </a:p>
@@ -3899,10 +4057,9 @@
           <a:lstStyle/>
           <a:p>
             <a:r>
-              <a:rPr lang="de-DE" smtClean="0"/>
+              <a:rPr lang="de-DE"/>
               <a:t>|  </a:t>
             </a:r>
-            <a:endParaRPr lang="de-DE"/>
           </a:p>
         </p:txBody>
       </p:sp>
@@ -3922,13 +4079,13 @@
           <a:lstStyle/>
           <a:p>
             <a:r>
-              <a:rPr lang="de-DE" smtClean="0"/>
+              <a:rPr lang="de-DE"/>
               <a:t>|  </a:t>
             </a:r>
             <a:fld id="{C36AA9A4-5D0B-4134-89A6-D8B9DAA4F25C}" type="slidenum">
               <a:rPr lang="de-DE" smtClean="0"/>
               <a:pPr/>
-              <a:t>23</a:t>
+              <a:t>22</a:t>
             </a:fld>
             <a:endParaRPr lang="de-DE"/>
           </a:p>
@@ -3937,7 +4094,7 @@
     </p:spTree>
     <p:extLst>
       <p:ext uri="{BB962C8B-B14F-4D97-AF65-F5344CB8AC3E}">
-        <p14:creationId xmlns:p14="http://schemas.microsoft.com/office/powerpoint/2010/main" val="83472082"/>
+        <p14:creationId xmlns:p14="http://schemas.microsoft.com/office/powerpoint/2010/main" val="614719273"/>
       </p:ext>
     </p:extLst>
   </p:cSld>
@@ -3996,10 +4153,6 @@
           <a:bodyPr/>
           <a:lstStyle/>
           <a:p>
-            <a:r>
-              <a:rPr lang="en-US" dirty="0" smtClean="0"/>
-              <a:t>Add photos </a:t>
-            </a:r>
             <a:endParaRPr lang="en-US" dirty="0"/>
           </a:p>
         </p:txBody>
@@ -4021,7 +4174,7 @@
           <a:p>
             <a:fld id="{BEF970E4-9540-437D-B70A-0A41E70CE984}" type="datetime4">
               <a:rPr lang="de-DE" smtClean="0"/>
-              <a:t>19. January 2017</a:t>
+              <a:t>23. January 2017</a:t>
             </a:fld>
             <a:endParaRPr lang="de-DE"/>
           </a:p>
@@ -4043,9 +4196,10 @@
           <a:lstStyle/>
           <a:p>
             <a:r>
-              <a:rPr lang="de-DE"/>
+              <a:rPr lang="de-DE" smtClean="0"/>
               <a:t>|  </a:t>
             </a:r>
+            <a:endParaRPr lang="de-DE"/>
           </a:p>
         </p:txBody>
       </p:sp>
@@ -4065,13 +4219,13 @@
           <a:lstStyle/>
           <a:p>
             <a:r>
-              <a:rPr lang="de-DE"/>
+              <a:rPr lang="de-DE" smtClean="0"/>
               <a:t>|  </a:t>
             </a:r>
             <a:fld id="{C36AA9A4-5D0B-4134-89A6-D8B9DAA4F25C}" type="slidenum">
               <a:rPr lang="de-DE" smtClean="0"/>
               <a:pPr/>
-              <a:t>24</a:t>
+              <a:t>23</a:t>
             </a:fld>
             <a:endParaRPr lang="de-DE"/>
           </a:p>
@@ -4080,7 +4234,7 @@
     </p:spTree>
     <p:extLst>
       <p:ext uri="{BB962C8B-B14F-4D97-AF65-F5344CB8AC3E}">
-        <p14:creationId xmlns:p14="http://schemas.microsoft.com/office/powerpoint/2010/main" val="459473194"/>
+        <p14:creationId xmlns:p14="http://schemas.microsoft.com/office/powerpoint/2010/main" val="83472082"/>
       </p:ext>
     </p:extLst>
   </p:cSld>
@@ -4164,7 +4318,7 @@
           <a:p>
             <a:fld id="{BEF970E4-9540-437D-B70A-0A41E70CE984}" type="datetime4">
               <a:rPr lang="de-DE" smtClean="0"/>
-              <a:t>19. January 2017</a:t>
+              <a:t>23. January 2017</a:t>
             </a:fld>
             <a:endParaRPr lang="de-DE"/>
           </a:p>
@@ -4282,6 +4436,10 @@
           <a:bodyPr/>
           <a:lstStyle/>
           <a:p>
+            <a:r>
+              <a:rPr lang="en-US" dirty="0" smtClean="0"/>
+              <a:t>Add photos </a:t>
+            </a:r>
             <a:endParaRPr lang="en-US" dirty="0"/>
           </a:p>
         </p:txBody>
@@ -4303,7 +4461,7 @@
           <a:p>
             <a:fld id="{BEF970E4-9540-437D-B70A-0A41E70CE984}" type="datetime4">
               <a:rPr lang="de-DE" smtClean="0"/>
-              <a:t>19. January 2017</a:t>
+              <a:t>23. January 2017</a:t>
             </a:fld>
             <a:endParaRPr lang="de-DE"/>
           </a:p>
@@ -4325,10 +4483,9 @@
           <a:lstStyle/>
           <a:p>
             <a:r>
-              <a:rPr lang="de-DE" smtClean="0"/>
+              <a:rPr lang="de-DE"/>
               <a:t>|  </a:t>
             </a:r>
-            <a:endParaRPr lang="de-DE"/>
           </a:p>
         </p:txBody>
       </p:sp>
@@ -4348,13 +4505,13 @@
           <a:lstStyle/>
           <a:p>
             <a:r>
-              <a:rPr lang="de-DE" smtClean="0"/>
+              <a:rPr lang="de-DE"/>
               <a:t>|  </a:t>
             </a:r>
             <a:fld id="{C36AA9A4-5D0B-4134-89A6-D8B9DAA4F25C}" type="slidenum">
               <a:rPr lang="de-DE" smtClean="0"/>
               <a:pPr/>
-              <a:t>25</a:t>
+              <a:t>24</a:t>
             </a:fld>
             <a:endParaRPr lang="de-DE"/>
           </a:p>
@@ -4363,7 +4520,7 @@
     </p:spTree>
     <p:extLst>
       <p:ext uri="{BB962C8B-B14F-4D97-AF65-F5344CB8AC3E}">
-        <p14:creationId xmlns:p14="http://schemas.microsoft.com/office/powerpoint/2010/main" val="1236201559"/>
+        <p14:creationId xmlns:p14="http://schemas.microsoft.com/office/powerpoint/2010/main" val="459473194"/>
       </p:ext>
     </p:extLst>
   </p:cSld>
@@ -4422,10 +4579,6 @@
           <a:bodyPr/>
           <a:lstStyle/>
           <a:p>
-            <a:r>
-              <a:rPr lang="en-US" dirty="0" smtClean="0"/>
-              <a:t>Add photos </a:t>
-            </a:r>
             <a:endParaRPr lang="en-US" dirty="0"/>
           </a:p>
         </p:txBody>
@@ -4447,7 +4600,7 @@
           <a:p>
             <a:fld id="{BEF970E4-9540-437D-B70A-0A41E70CE984}" type="datetime4">
               <a:rPr lang="de-DE" smtClean="0"/>
-              <a:t>19. January 2017</a:t>
+              <a:t>23. January 2017</a:t>
             </a:fld>
             <a:endParaRPr lang="de-DE"/>
           </a:p>
@@ -4469,9 +4622,10 @@
           <a:lstStyle/>
           <a:p>
             <a:r>
-              <a:rPr lang="de-DE"/>
+              <a:rPr lang="de-DE" smtClean="0"/>
               <a:t>|  </a:t>
             </a:r>
+            <a:endParaRPr lang="de-DE"/>
           </a:p>
         </p:txBody>
       </p:sp>
@@ -4491,13 +4645,13 @@
           <a:lstStyle/>
           <a:p>
             <a:r>
-              <a:rPr lang="de-DE"/>
+              <a:rPr lang="de-DE" smtClean="0"/>
               <a:t>|  </a:t>
             </a:r>
             <a:fld id="{C36AA9A4-5D0B-4134-89A6-D8B9DAA4F25C}" type="slidenum">
               <a:rPr lang="de-DE" smtClean="0"/>
               <a:pPr/>
-              <a:t>26</a:t>
+              <a:t>25</a:t>
             </a:fld>
             <a:endParaRPr lang="de-DE"/>
           </a:p>
@@ -4506,7 +4660,7 @@
     </p:spTree>
     <p:extLst>
       <p:ext uri="{BB962C8B-B14F-4D97-AF65-F5344CB8AC3E}">
-        <p14:creationId xmlns:p14="http://schemas.microsoft.com/office/powerpoint/2010/main" val="1957951507"/>
+        <p14:creationId xmlns:p14="http://schemas.microsoft.com/office/powerpoint/2010/main" val="1236201559"/>
       </p:ext>
     </p:extLst>
   </p:cSld>
@@ -4565,7 +4719,11 @@
           <a:bodyPr/>
           <a:lstStyle/>
           <a:p>
-            <a:endParaRPr lang="en-US"/>
+            <a:r>
+              <a:rPr lang="en-US" dirty="0" smtClean="0"/>
+              <a:t>Add photos </a:t>
+            </a:r>
+            <a:endParaRPr lang="en-US" dirty="0"/>
           </a:p>
         </p:txBody>
       </p:sp>
@@ -4586,7 +4744,7 @@
           <a:p>
             <a:fld id="{BEF970E4-9540-437D-B70A-0A41E70CE984}" type="datetime4">
               <a:rPr lang="de-DE" smtClean="0"/>
-              <a:t>19. January 2017</a:t>
+              <a:t>23. January 2017</a:t>
             </a:fld>
             <a:endParaRPr lang="de-DE"/>
           </a:p>
@@ -4608,10 +4766,9 @@
           <a:lstStyle/>
           <a:p>
             <a:r>
-              <a:rPr lang="de-DE" smtClean="0"/>
+              <a:rPr lang="de-DE"/>
               <a:t>|  </a:t>
             </a:r>
-            <a:endParaRPr lang="de-DE"/>
           </a:p>
         </p:txBody>
       </p:sp>
@@ -4631,13 +4788,13 @@
           <a:lstStyle/>
           <a:p>
             <a:r>
-              <a:rPr lang="de-DE" smtClean="0"/>
+              <a:rPr lang="de-DE"/>
               <a:t>|  </a:t>
             </a:r>
             <a:fld id="{C36AA9A4-5D0B-4134-89A6-D8B9DAA4F25C}" type="slidenum">
               <a:rPr lang="de-DE" smtClean="0"/>
               <a:pPr/>
-              <a:t>27</a:t>
+              <a:t>26</a:t>
             </a:fld>
             <a:endParaRPr lang="de-DE"/>
           </a:p>
@@ -4646,7 +4803,7 @@
     </p:spTree>
     <p:extLst>
       <p:ext uri="{BB962C8B-B14F-4D97-AF65-F5344CB8AC3E}">
-        <p14:creationId xmlns:p14="http://schemas.microsoft.com/office/powerpoint/2010/main" val="334645891"/>
+        <p14:creationId xmlns:p14="http://schemas.microsoft.com/office/powerpoint/2010/main" val="1957951507"/>
       </p:ext>
     </p:extLst>
   </p:cSld>
@@ -4705,11 +4862,7 @@
           <a:bodyPr/>
           <a:lstStyle/>
           <a:p>
-            <a:r>
-              <a:rPr lang="en-US" smtClean="0"/>
-              <a:t>Add photos </a:t>
-            </a:r>
-            <a:endParaRPr lang="en-US" dirty="0"/>
+            <a:endParaRPr lang="en-US"/>
           </a:p>
         </p:txBody>
       </p:sp>
@@ -4730,7 +4883,7 @@
           <a:p>
             <a:fld id="{BEF970E4-9540-437D-B70A-0A41E70CE984}" type="datetime4">
               <a:rPr lang="de-DE" smtClean="0"/>
-              <a:t>19. January 2017</a:t>
+              <a:t>23. January 2017</a:t>
             </a:fld>
             <a:endParaRPr lang="de-DE"/>
           </a:p>
@@ -4752,9 +4905,10 @@
           <a:lstStyle/>
           <a:p>
             <a:r>
-              <a:rPr lang="de-DE"/>
+              <a:rPr lang="de-DE" smtClean="0"/>
               <a:t>|  </a:t>
             </a:r>
+            <a:endParaRPr lang="de-DE"/>
           </a:p>
         </p:txBody>
       </p:sp>
@@ -4774,13 +4928,13 @@
           <a:lstStyle/>
           <a:p>
             <a:r>
-              <a:rPr lang="de-DE"/>
+              <a:rPr lang="de-DE" smtClean="0"/>
               <a:t>|  </a:t>
             </a:r>
             <a:fld id="{C36AA9A4-5D0B-4134-89A6-D8B9DAA4F25C}" type="slidenum">
               <a:rPr lang="de-DE" smtClean="0"/>
               <a:pPr/>
-              <a:t>28</a:t>
+              <a:t>27</a:t>
             </a:fld>
             <a:endParaRPr lang="de-DE"/>
           </a:p>
@@ -4789,7 +4943,7 @@
     </p:spTree>
     <p:extLst>
       <p:ext uri="{BB962C8B-B14F-4D97-AF65-F5344CB8AC3E}">
-        <p14:creationId xmlns:p14="http://schemas.microsoft.com/office/powerpoint/2010/main" val="1500454912"/>
+        <p14:creationId xmlns:p14="http://schemas.microsoft.com/office/powerpoint/2010/main" val="334645891"/>
       </p:ext>
     </p:extLst>
   </p:cSld>
@@ -4849,7 +5003,7 @@
           <a:lstStyle/>
           <a:p>
             <a:r>
-              <a:rPr lang="en-US" dirty="0" smtClean="0"/>
+              <a:rPr lang="en-US" smtClean="0"/>
               <a:t>Add photos </a:t>
             </a:r>
             <a:endParaRPr lang="en-US" dirty="0"/>
@@ -4873,7 +5027,150 @@
           <a:p>
             <a:fld id="{BEF970E4-9540-437D-B70A-0A41E70CE984}" type="datetime4">
               <a:rPr lang="de-DE" smtClean="0"/>
-              <a:t>19. January 2017</a:t>
+              <a:t>23. January 2017</a:t>
+            </a:fld>
+            <a:endParaRPr lang="de-DE"/>
+          </a:p>
+        </p:txBody>
+      </p:sp>
+      <p:sp>
+        <p:nvSpPr>
+          <p:cNvPr id="5" name="Footer Placeholder 4"/>
+          <p:cNvSpPr>
+            <a:spLocks noGrp="1"/>
+          </p:cNvSpPr>
+          <p:nvPr>
+            <p:ph type="ftr" sz="quarter" idx="11"/>
+          </p:nvPr>
+        </p:nvSpPr>
+        <p:spPr/>
+        <p:txBody>
+          <a:bodyPr/>
+          <a:lstStyle/>
+          <a:p>
+            <a:r>
+              <a:rPr lang="de-DE"/>
+              <a:t>|  </a:t>
+            </a:r>
+          </a:p>
+        </p:txBody>
+      </p:sp>
+      <p:sp>
+        <p:nvSpPr>
+          <p:cNvPr id="6" name="Slide Number Placeholder 5"/>
+          <p:cNvSpPr>
+            <a:spLocks noGrp="1"/>
+          </p:cNvSpPr>
+          <p:nvPr>
+            <p:ph type="sldNum" sz="quarter" idx="12"/>
+          </p:nvPr>
+        </p:nvSpPr>
+        <p:spPr/>
+        <p:txBody>
+          <a:bodyPr/>
+          <a:lstStyle/>
+          <a:p>
+            <a:r>
+              <a:rPr lang="de-DE"/>
+              <a:t>|  </a:t>
+            </a:r>
+            <a:fld id="{C36AA9A4-5D0B-4134-89A6-D8B9DAA4F25C}" type="slidenum">
+              <a:rPr lang="de-DE" smtClean="0"/>
+              <a:pPr/>
+              <a:t>28</a:t>
+            </a:fld>
+            <a:endParaRPr lang="de-DE"/>
+          </a:p>
+        </p:txBody>
+      </p:sp>
+    </p:spTree>
+    <p:extLst>
+      <p:ext uri="{BB962C8B-B14F-4D97-AF65-F5344CB8AC3E}">
+        <p14:creationId xmlns:p14="http://schemas.microsoft.com/office/powerpoint/2010/main" val="1500454912"/>
+      </p:ext>
+    </p:extLst>
+  </p:cSld>
+  <p:clrMapOvr>
+    <a:masterClrMapping/>
+  </p:clrMapOvr>
+</p:notes>
+</file>
+
+<file path=ppt/notesSlides/notesSlide25.xml><?xml version="1.0" encoding="utf-8"?>
+<p:notes xmlns:a="http://schemas.openxmlformats.org/drawingml/2006/main" xmlns:r="http://schemas.openxmlformats.org/officeDocument/2006/relationships" xmlns:p="http://schemas.openxmlformats.org/presentationml/2006/main">
+  <p:cSld>
+    <p:spTree>
+      <p:nvGrpSpPr>
+        <p:cNvPr id="1" name=""/>
+        <p:cNvGrpSpPr/>
+        <p:nvPr/>
+      </p:nvGrpSpPr>
+      <p:grpSpPr>
+        <a:xfrm>
+          <a:off x="0" y="0"/>
+          <a:ext cx="0" cy="0"/>
+          <a:chOff x="0" y="0"/>
+          <a:chExt cx="0" cy="0"/>
+        </a:xfrm>
+      </p:grpSpPr>
+      <p:sp>
+        <p:nvSpPr>
+          <p:cNvPr id="2" name="Slide Image Placeholder 1"/>
+          <p:cNvSpPr>
+            <a:spLocks noGrp="1" noRot="1" noChangeAspect="1"/>
+          </p:cNvSpPr>
+          <p:nvPr>
+            <p:ph type="sldImg"/>
+          </p:nvPr>
+        </p:nvSpPr>
+        <p:spPr>
+          <a:xfrm>
+            <a:off x="1371600" y="923925"/>
+            <a:ext cx="4095750" cy="3071813"/>
+          </a:xfrm>
+        </p:spPr>
+      </p:sp>
+      <p:sp>
+        <p:nvSpPr>
+          <p:cNvPr id="3" name="Notes Placeholder 2"/>
+          <p:cNvSpPr>
+            <a:spLocks noGrp="1"/>
+          </p:cNvSpPr>
+          <p:nvPr>
+            <p:ph type="body" idx="1"/>
+          </p:nvPr>
+        </p:nvSpPr>
+        <p:spPr/>
+        <p:txBody>
+          <a:bodyPr/>
+          <a:lstStyle/>
+          <a:p>
+            <a:r>
+              <a:rPr lang="en-US" dirty="0" smtClean="0"/>
+              <a:t>Add photos </a:t>
+            </a:r>
+            <a:endParaRPr lang="en-US" dirty="0"/>
+          </a:p>
+        </p:txBody>
+      </p:sp>
+      <p:sp>
+        <p:nvSpPr>
+          <p:cNvPr id="4" name="Date Placeholder 3"/>
+          <p:cNvSpPr>
+            <a:spLocks noGrp="1"/>
+          </p:cNvSpPr>
+          <p:nvPr>
+            <p:ph type="dt" idx="10"/>
+          </p:nvPr>
+        </p:nvSpPr>
+        <p:spPr/>
+        <p:txBody>
+          <a:bodyPr/>
+          <a:lstStyle/>
+          <a:p>
+            <a:fld id="{BEF970E4-9540-437D-B70A-0A41E70CE984}" type="datetime4">
+              <a:rPr lang="de-DE" smtClean="0"/>
+              <a:t>23. January 2017</a:t>
             </a:fld>
             <a:endParaRPr lang="de-DE"/>
           </a:p>
@@ -5030,7 +5327,7 @@
           <a:p>
             <a:fld id="{BEF970E4-9540-437D-B70A-0A41E70CE984}" type="datetime4">
               <a:rPr lang="de-DE" smtClean="0"/>
-              <a:t>19. January 2017</a:t>
+              <a:t>23. January 2017</a:t>
             </a:fld>
             <a:endParaRPr lang="de-DE"/>
           </a:p>
@@ -5178,7 +5475,7 @@
           <a:p>
             <a:fld id="{BEF970E4-9540-437D-B70A-0A41E70CE984}" type="datetime4">
               <a:rPr lang="de-DE" smtClean="0"/>
-              <a:t>19. January 2017</a:t>
+              <a:t>23. January 2017</a:t>
             </a:fld>
             <a:endParaRPr lang="de-DE"/>
           </a:p>
@@ -5326,7 +5623,7 @@
           <a:p>
             <a:fld id="{BEF970E4-9540-437D-B70A-0A41E70CE984}" type="datetime4">
               <a:rPr lang="de-DE" smtClean="0"/>
-              <a:t>19. January 2017</a:t>
+              <a:t>23. January 2017</a:t>
             </a:fld>
             <a:endParaRPr lang="de-DE"/>
           </a:p>
@@ -5474,7 +5771,7 @@
           <a:p>
             <a:fld id="{BEF970E4-9540-437D-B70A-0A41E70CE984}" type="datetime4">
               <a:rPr lang="de-DE" smtClean="0"/>
-              <a:t>19. January 2017</a:t>
+              <a:t>23. January 2017</a:t>
             </a:fld>
             <a:endParaRPr lang="de-DE"/>
           </a:p>
@@ -5595,7 +5892,11 @@
           <a:p>
             <a:r>
               <a:rPr lang="en-US" dirty="0" smtClean="0"/>
-              <a:t>POPMP: proposed </a:t>
+              <a:t>POMP</a:t>
+            </a:r>
+            <a:r>
+              <a:rPr lang="en-US" dirty="0" smtClean="0"/>
+              <a:t>: proposed </a:t>
             </a:r>
             <a:r>
               <a:rPr lang="en-US" dirty="0" err="1" smtClean="0"/>
@@ -5626,7 +5927,7 @@
           <a:p>
             <a:fld id="{BEF970E4-9540-437D-B70A-0A41E70CE984}" type="datetime4">
               <a:rPr lang="de-DE" smtClean="0"/>
-              <a:t>19. January 2017</a:t>
+              <a:t>23. January 2017</a:t>
             </a:fld>
             <a:endParaRPr lang="de-DE"/>
           </a:p>
@@ -5766,7 +6067,7 @@
           <a:p>
             <a:fld id="{BEF970E4-9540-437D-B70A-0A41E70CE984}" type="datetime4">
               <a:rPr lang="de-DE" smtClean="0"/>
-              <a:t>19. January 2017</a:t>
+              <a:t>23. January 2017</a:t>
             </a:fld>
             <a:endParaRPr lang="de-DE"/>
           </a:p>
@@ -5885,106 +6186,174 @@
           <a:bodyPr/>
           <a:lstStyle/>
           <a:p>
-            <a:pPr marL="701675" lvl="2" indent="-342900">
-              <a:buFont typeface="Arial" charset="0"/>
-              <a:buChar char="•"/>
+            <a:pPr marL="0" marR="0" indent="0" algn="l" defTabSz="914400" rtl="0" eaLnBrk="1" fontAlgn="base" latinLnBrk="0" hangingPunct="1">
+              <a:lnSpc>
+                <a:spcPct val="100000"/>
+              </a:lnSpc>
+              <a:spcBef>
+                <a:spcPct val="10000"/>
+              </a:spcBef>
+              <a:spcAft>
+                <a:spcPct val="0"/>
+              </a:spcAft>
+              <a:buClrTx/>
+              <a:buSzTx/>
+              <a:buFontTx/>
+              <a:buNone/>
+              <a:tabLst/>
+              <a:defRPr/>
             </a:pPr>
             <a:r>
+              <a:rPr lang="en-US" dirty="0" err="1" smtClean="0"/>
+              <a:t>ThreadSpotter</a:t>
+            </a:r>
+            <a:r>
               <a:rPr lang="en-US" dirty="0" smtClean="0"/>
-              <a:t>Enhancing the application memory access regularity</a:t>
-            </a:r>
-          </a:p>
-          <a:p>
-            <a:pPr marL="881062" lvl="3" indent="-342900">
-              <a:buFont typeface="Arial" charset="0"/>
-              <a:buChar char="•"/>
+              <a:t> will help you understand and improve the runtime performance of your applications by identifying areas where the program is using processor cache memory, and in some cases suggests ways to restructure the code to make more effective use of the cache memory. </a:t>
+            </a:r>
+          </a:p>
+          <a:p>
+            <a:pPr marL="0" marR="0" lvl="2" indent="0" algn="l" defTabSz="914400" rtl="0" eaLnBrk="1" fontAlgn="base" latinLnBrk="0" hangingPunct="1">
+              <a:lnSpc>
+                <a:spcPct val="100000"/>
+              </a:lnSpc>
+              <a:spcBef>
+                <a:spcPct val="10000"/>
+              </a:spcBef>
+              <a:spcAft>
+                <a:spcPct val="0"/>
+              </a:spcAft>
+              <a:buClrTx/>
+              <a:buSzTx/>
+              <a:buFontTx/>
+              <a:buNone/>
+              <a:tabLst/>
+              <a:defRPr/>
             </a:pPr>
             <a:r>
               <a:rPr lang="en-US" dirty="0" smtClean="0"/>
-              <a:t>To help hardware </a:t>
-            </a:r>
-            <a:r>
-              <a:rPr lang="en-US" dirty="0" err="1" smtClean="0"/>
+              <a:t>Memory bandwidth: Limitations</a:t>
+            </a:r>
+            <a:r>
+              <a:rPr lang="en-US" baseline="0" dirty="0" smtClean="0"/>
+              <a:t> of memory bus</a:t>
+            </a:r>
+          </a:p>
+          <a:p>
+            <a:pPr marL="0" marR="0" lvl="2" indent="0" algn="l" defTabSz="914400" rtl="0" eaLnBrk="1" fontAlgn="base" latinLnBrk="0" hangingPunct="1">
+              <a:lnSpc>
+                <a:spcPct val="100000"/>
+              </a:lnSpc>
+              <a:spcBef>
+                <a:spcPct val="10000"/>
+              </a:spcBef>
+              <a:spcAft>
+                <a:spcPct val="0"/>
+              </a:spcAft>
+              <a:buClrTx/>
+              <a:buSzTx/>
+              <a:buFontTx/>
+              <a:buNone/>
+              <a:tabLst/>
+              <a:defRPr/>
+            </a:pPr>
+            <a:r>
+              <a:rPr lang="en-US" baseline="0" dirty="0" smtClean="0"/>
+              <a:t>Memory Latency: The regularity of the application’s memory accesses affect the efficiency of  hardware </a:t>
+            </a:r>
+            <a:r>
+              <a:rPr lang="en-US" baseline="0" dirty="0" err="1" smtClean="0"/>
               <a:t>prefetcher</a:t>
             </a:r>
+            <a:r>
+              <a:rPr lang="en-US" baseline="0" dirty="0" smtClean="0"/>
+              <a:t>(Higher cache misses)</a:t>
+            </a:r>
+          </a:p>
+          <a:p>
+            <a:pPr marL="0" marR="0" lvl="2" indent="0" algn="l" defTabSz="914400" rtl="0" eaLnBrk="1" fontAlgn="base" latinLnBrk="0" hangingPunct="1">
+              <a:lnSpc>
+                <a:spcPct val="100000"/>
+              </a:lnSpc>
+              <a:spcBef>
+                <a:spcPct val="10000"/>
+              </a:spcBef>
+              <a:spcAft>
+                <a:spcPct val="0"/>
+              </a:spcAft>
+              <a:buClrTx/>
+              <a:buSzTx/>
+              <a:buFontTx/>
+              <a:buNone/>
+              <a:tabLst/>
+              <a:defRPr/>
+            </a:pPr>
+            <a:r>
+              <a:rPr lang="en-US" baseline="0" dirty="0" smtClean="0"/>
+              <a:t>Data Locality: Caches filled with the unused data causing high cache miss rates</a:t>
+            </a:r>
+          </a:p>
+          <a:p>
+            <a:pPr marL="0" marR="0" lvl="2" indent="0" algn="l" defTabSz="914400" rtl="0" eaLnBrk="1" fontAlgn="base" latinLnBrk="0" hangingPunct="1">
+              <a:lnSpc>
+                <a:spcPct val="100000"/>
+              </a:lnSpc>
+              <a:spcBef>
+                <a:spcPct val="10000"/>
+              </a:spcBef>
+              <a:spcAft>
+                <a:spcPct val="0"/>
+              </a:spcAft>
+              <a:buClrTx/>
+              <a:buSzTx/>
+              <a:buFontTx/>
+              <a:buNone/>
+              <a:tabLst/>
+              <a:defRPr/>
+            </a:pPr>
             <a:endParaRPr lang="en-US" dirty="0" smtClean="0"/>
           </a:p>
           <a:p>
-            <a:pPr marL="701675" lvl="2" indent="-342900">
-              <a:buFont typeface="Arial" charset="0"/>
-              <a:buChar char="•"/>
+            <a:pPr marL="0" marR="0" indent="0" algn="l" defTabSz="914400" rtl="0" eaLnBrk="1" fontAlgn="base" latinLnBrk="0" hangingPunct="1">
+              <a:lnSpc>
+                <a:spcPct val="100000"/>
+              </a:lnSpc>
+              <a:spcBef>
+                <a:spcPct val="10000"/>
+              </a:spcBef>
+              <a:spcAft>
+                <a:spcPct val="0"/>
+              </a:spcAft>
+              <a:buClrTx/>
+              <a:buSzTx/>
+              <a:buFontTx/>
+              <a:buNone/>
+              <a:tabLst/>
+              <a:defRPr/>
             </a:pPr>
+            <a:endParaRPr lang="en-US" dirty="0" smtClean="0"/>
+          </a:p>
+          <a:p>
+            <a:pPr marL="0" marR="0" indent="0" algn="l" defTabSz="914400" rtl="0" eaLnBrk="1" fontAlgn="base" latinLnBrk="0" hangingPunct="1">
+              <a:lnSpc>
+                <a:spcPct val="100000"/>
+              </a:lnSpc>
+              <a:spcBef>
+                <a:spcPct val="10000"/>
+              </a:spcBef>
+              <a:spcAft>
+                <a:spcPct val="0"/>
+              </a:spcAft>
+              <a:buClrTx/>
+              <a:buSzTx/>
+              <a:buFontTx/>
+              <a:buNone/>
+              <a:tabLst/>
+              <a:defRPr/>
+            </a:pPr>
             <a:r>
               <a:rPr lang="en-US" dirty="0" smtClean="0"/>
-              <a:t>Enhancing spatial locality </a:t>
-            </a:r>
-          </a:p>
-          <a:p>
-            <a:pPr marL="881062" lvl="3" indent="-342900">
-              <a:buFont typeface="Arial" charset="0"/>
-              <a:buChar char="•"/>
-            </a:pPr>
-            <a:r>
-              <a:rPr lang="en-US" dirty="0" smtClean="0"/>
-              <a:t>To help minimize the amount of unused data transferred between memory and cache</a:t>
-            </a:r>
-          </a:p>
-          <a:p>
-            <a:pPr marL="881062" lvl="3" indent="-342900">
-              <a:buFont typeface="Arial" charset="0"/>
-              <a:buChar char="•"/>
-            </a:pPr>
-            <a:r>
-              <a:rPr lang="en-US" dirty="0" smtClean="0"/>
-              <a:t>Minimize the amount of cache space occupied by unused data</a:t>
-            </a:r>
-          </a:p>
-          <a:p>
-            <a:pPr marL="701675" lvl="2" indent="-342900">
-              <a:buFont typeface="Arial" charset="0"/>
-              <a:buChar char="•"/>
-            </a:pPr>
-            <a:r>
-              <a:rPr lang="en-US" dirty="0" smtClean="0"/>
-              <a:t>Enhancing temporal locality</a:t>
-            </a:r>
-          </a:p>
-          <a:p>
-            <a:pPr marL="881062" lvl="3" indent="-342900">
-              <a:buFont typeface="Arial" charset="0"/>
-              <a:buChar char="•"/>
-            </a:pPr>
-            <a:r>
-              <a:rPr lang="en-US" dirty="0" smtClean="0"/>
-              <a:t>By suggesting ways to reuse data while it remains in the cache</a:t>
-            </a:r>
-          </a:p>
-          <a:p>
-            <a:pPr marL="701675" lvl="2" indent="-342900">
-              <a:buFont typeface="Arial" charset="0"/>
-              <a:buChar char="•"/>
-            </a:pPr>
-            <a:r>
-              <a:rPr lang="en-US" dirty="0" smtClean="0"/>
-              <a:t>Hide memory access</a:t>
-            </a:r>
-          </a:p>
-          <a:p>
-            <a:pPr marL="881062" lvl="3" indent="-342900">
-              <a:buFont typeface="Arial" charset="0"/>
-              <a:buChar char="•"/>
-            </a:pPr>
-            <a:r>
-              <a:rPr lang="en-US" dirty="0" smtClean="0"/>
-              <a:t>By adding </a:t>
-            </a:r>
-            <a:r>
-              <a:rPr lang="en-US" dirty="0" err="1" smtClean="0"/>
-              <a:t>prefetch</a:t>
-            </a:r>
-            <a:r>
-              <a:rPr lang="en-US" dirty="0" smtClean="0"/>
-              <a:t> instructions</a:t>
+              <a:t>	</a:t>
             </a:r>
           </a:p>
           <a:p>
@@ -6009,7 +6378,7 @@
           <a:p>
             <a:fld id="{BEF970E4-9540-437D-B70A-0A41E70CE984}" type="datetime4">
               <a:rPr lang="de-DE" smtClean="0"/>
-              <a:t>19. January 2017</a:t>
+              <a:t>23. January 2017</a:t>
             </a:fld>
             <a:endParaRPr lang="de-DE"/>
           </a:p>
@@ -6060,7 +6429,7 @@
             <a:fld id="{C36AA9A4-5D0B-4134-89A6-D8B9DAA4F25C}" type="slidenum">
               <a:rPr lang="de-DE" smtClean="0"/>
               <a:pPr/>
-              <a:t>13</a:t>
+              <a:t>12</a:t>
             </a:fld>
             <a:endParaRPr lang="de-DE"/>
           </a:p>
@@ -6069,7 +6438,7 @@
     </p:spTree>
     <p:extLst>
       <p:ext uri="{BB962C8B-B14F-4D97-AF65-F5344CB8AC3E}">
-        <p14:creationId xmlns:p14="http://schemas.microsoft.com/office/powerpoint/2010/main" val="856152240"/>
+        <p14:creationId xmlns:p14="http://schemas.microsoft.com/office/powerpoint/2010/main" val="1829572801"/>
       </p:ext>
     </p:extLst>
   </p:cSld>
@@ -6446,7 +6815,7 @@
                 <a:tabLst/>
                 <a:defRPr/>
               </a:pPr>
-              <a:t>19.01.17</a:t>
+              <a:t>23.01.17</a:t>
             </a:fld>
             <a:r>
               <a:rPr kumimoji="0" lang="de-DE" sz="1000" b="0" i="0" u="none" strike="noStrike" kern="1200" cap="none" spc="0" normalizeH="0" baseline="0" noProof="0" dirty="0">
@@ -6997,7 +7366,7 @@
                 <a:tabLst/>
                 <a:defRPr/>
               </a:pPr>
-              <a:t>19.01.17</a:t>
+              <a:t>23.01.17</a:t>
             </a:fld>
             <a:r>
               <a:rPr kumimoji="0" lang="de-DE" sz="1000" b="0" i="0" u="none" strike="noStrike" kern="1200" cap="none" spc="0" normalizeH="0" baseline="0" noProof="0" dirty="0">
@@ -10000,7 +10369,7 @@
                 <a:tabLst/>
                 <a:defRPr/>
               </a:pPr>
-              <a:t>19.01.17</a:t>
+              <a:t>23.01.17</a:t>
             </a:fld>
             <a:r>
               <a:rPr kumimoji="0" lang="de-DE" sz="1000" b="0" i="0" u="none" strike="noStrike" kern="1200" cap="none" spc="0" normalizeH="0" baseline="0" noProof="0" dirty="0">
@@ -11084,7 +11453,7 @@
                 <a:tabLst/>
                 <a:defRPr/>
               </a:pPr>
-              <a:t>19.01.17</a:t>
+              <a:t>23.01.17</a:t>
             </a:fld>
             <a:r>
               <a:rPr kumimoji="0" lang="de-DE" sz="1000" b="0" i="0" u="none" strike="noStrike" kern="1200" cap="none" spc="0" normalizeH="0" baseline="0" noProof="0" dirty="0">
@@ -11775,30 +12144,22 @@
           <a:lstStyle/>
           <a:p>
             <a:r>
-              <a:rPr lang="en-US" b="0" dirty="0"/>
-              <a:t>Integrating </a:t>
-            </a:r>
-            <a:r>
-              <a:rPr lang="en-US" b="0" dirty="0" smtClean="0"/>
-              <a:t>Temporal </a:t>
-            </a:r>
-            <a:r>
-              <a:rPr lang="en-US" b="0" dirty="0"/>
-              <a:t>I</a:t>
-            </a:r>
-            <a:r>
-              <a:rPr lang="en-US" b="0" dirty="0" smtClean="0"/>
-              <a:t>nformation </a:t>
-            </a:r>
-            <a:r>
-              <a:rPr lang="en-US" b="0" dirty="0"/>
-              <a:t>in </a:t>
-            </a:r>
-            <a:r>
-              <a:rPr lang="en-US" b="0" dirty="0" smtClean="0"/>
-              <a:t>Data Communication Profiling for OpenMP</a:t>
-            </a:r>
-            <a:endParaRPr lang="de-DE" dirty="0"/>
+              <a:rPr lang="en-US" dirty="0"/>
+              <a:t>Detecting </a:t>
+            </a:r>
+            <a:r>
+              <a:rPr lang="en-US" dirty="0" smtClean="0"/>
+              <a:t>Thread Communication Patterns </a:t>
+            </a:r>
+            <a:r>
+              <a:rPr lang="en-US" dirty="0"/>
+              <a:t>in OpenMP </a:t>
+            </a:r>
+            <a:r>
+              <a:rPr lang="en-US" dirty="0" smtClean="0"/>
+              <a:t>Applications </a:t>
+            </a:r>
+            <a:endParaRPr lang="en-US" dirty="0"/>
           </a:p>
         </p:txBody>
       </p:sp>
@@ -12505,7 +12866,7 @@
       </p:sp>
       <p:pic>
         <p:nvPicPr>
-          <p:cNvPr id="14" name="Picture 13"/>
+          <p:cNvPr id="4" name="Picture 3"/>
           <p:cNvPicPr>
             <a:picLocks noChangeAspect="1"/>
           </p:cNvPicPr>
@@ -12525,8 +12886,8 @@
         </p:blipFill>
         <p:spPr>
           <a:xfrm>
-            <a:off x="4518817" y="2071019"/>
-            <a:ext cx="4238360" cy="2828156"/>
+            <a:off x="4578668" y="1885997"/>
+            <a:ext cx="3593731" cy="3081281"/>
           </a:xfrm>
           <a:prstGeom prst="rect">
             <a:avLst/>
@@ -12541,8 +12902,8 @@
         </p:nvSpPr>
         <p:spPr>
           <a:xfrm>
-            <a:off x="4928204" y="2710281"/>
-            <a:ext cx="72008" cy="1584176"/>
+            <a:off x="5076056" y="2636912"/>
+            <a:ext cx="45719" cy="1584176"/>
           </a:xfrm>
           <a:prstGeom prst="leftBracket">
             <a:avLst/>
@@ -12584,8 +12945,8 @@
         </p:nvSpPr>
         <p:spPr>
           <a:xfrm>
-            <a:off x="5409598" y="3364867"/>
-            <a:ext cx="65154" cy="504056"/>
+            <a:off x="5580112" y="3284984"/>
+            <a:ext cx="45719" cy="461584"/>
           </a:xfrm>
           <a:prstGeom prst="leftBracket">
             <a:avLst/>
@@ -12627,7 +12988,7 @@
         </p:nvSpPr>
         <p:spPr>
           <a:xfrm>
-            <a:off x="6937751" y="4651145"/>
+            <a:off x="6486476" y="4614047"/>
             <a:ext cx="2045964" cy="648072"/>
           </a:xfrm>
           <a:prstGeom prst="roundRect">
@@ -12704,8 +13065,8 @@
         </p:nvCxnSpPr>
         <p:spPr>
           <a:xfrm>
-            <a:off x="6804248" y="4365104"/>
-            <a:ext cx="360040" cy="288032"/>
+            <a:off x="7092280" y="4293096"/>
+            <a:ext cx="304359" cy="320951"/>
           </a:xfrm>
           <a:prstGeom prst="straightConnector1">
             <a:avLst/>
@@ -12798,13 +13159,35 @@
             </a:pPr>
             <a:r>
               <a:rPr lang="en-US" dirty="0" smtClean="0"/>
-              <a:t>Analyzes an application’s interaction with the cache and the </a:t>
+              <a:t>Analyzes </a:t>
+            </a:r>
+            <a:r>
+              <a:rPr lang="en-US" dirty="0" smtClean="0"/>
+              <a:t>an application’s interaction with the cache and the </a:t>
             </a:r>
             <a:r>
               <a:rPr lang="en-US" dirty="0"/>
               <a:t>memory subsystems </a:t>
             </a:r>
             <a:endParaRPr lang="en-US" dirty="0" smtClean="0"/>
+          </a:p>
+          <a:p>
+            <a:pPr marL="342900" lvl="1" indent="-342900">
+              <a:buFont typeface="Arial" charset="0"/>
+              <a:buChar char="•"/>
+            </a:pPr>
+            <a:r>
+              <a:rPr lang="en-US" dirty="0" smtClean="0"/>
+              <a:t>Suggests </a:t>
+            </a:r>
+            <a:r>
+              <a:rPr lang="en-US" dirty="0"/>
+              <a:t>ways to restructure the code to make more effective use of the cache </a:t>
+            </a:r>
+            <a:r>
+              <a:rPr lang="en-US" dirty="0" smtClean="0"/>
+              <a:t>memory based on</a:t>
+            </a:r>
           </a:p>
           <a:p>
             <a:pPr marL="701675" lvl="2" indent="-342900">
@@ -12813,7 +13196,7 @@
             </a:pPr>
             <a:r>
               <a:rPr lang="en-US" dirty="0" smtClean="0"/>
-              <a:t>Single and multithread code on single and multithread cores and  multiprocessor machine</a:t>
+              <a:t>Memory bandwidth</a:t>
             </a:r>
           </a:p>
           <a:p>
@@ -12821,6 +13204,30 @@
               <a:buFont typeface="Arial" charset="0"/>
               <a:buChar char="•"/>
             </a:pPr>
+            <a:r>
+              <a:rPr lang="en-US" dirty="0" smtClean="0"/>
+              <a:t>Memory Latency</a:t>
+            </a:r>
+          </a:p>
+          <a:p>
+            <a:pPr marL="701675" lvl="2" indent="-342900">
+              <a:buFont typeface="Arial" charset="0"/>
+              <a:buChar char="•"/>
+            </a:pPr>
+            <a:r>
+              <a:rPr lang="en-US" dirty="0" smtClean="0"/>
+              <a:t>Data Locality</a:t>
+            </a:r>
+          </a:p>
+          <a:p>
+            <a:pPr marL="701675" lvl="2" indent="-342900">
+              <a:buFont typeface="Arial" charset="0"/>
+              <a:buChar char="•"/>
+            </a:pPr>
+            <a:r>
+              <a:rPr lang="en-US" dirty="0" smtClean="0"/>
+              <a:t>Thread communication/ interaction</a:t>
+            </a:r>
             <a:endParaRPr lang="en-US" dirty="0"/>
           </a:p>
           <a:p>
@@ -12828,20 +13235,7 @@
               <a:buFont typeface="Arial" charset="0"/>
               <a:buChar char="•"/>
             </a:pPr>
-            <a:r>
-              <a:rPr lang="en-US" dirty="0" smtClean="0"/>
-              <a:t>Focuses on multithreaded issues on multi-cores	</a:t>
-            </a:r>
-          </a:p>
-          <a:p>
-            <a:pPr marL="701675" lvl="2" indent="-342900">
-              <a:buFont typeface="Arial" charset="0"/>
-              <a:buChar char="•"/>
-            </a:pPr>
-            <a:r>
-              <a:rPr lang="en-US" dirty="0" smtClean="0"/>
-              <a:t>From thread interaction and communication between the cores and caches within the processor</a:t>
-            </a:r>
+            <a:endParaRPr lang="en-US" dirty="0" smtClean="0"/>
           </a:p>
           <a:p>
             <a:r>
@@ -12917,13 +13311,13 @@
           <a:p>
             <a:r>
               <a:rPr lang="en-US" sz="1000" dirty="0">
-                <a:hlinkClick r:id="rId2"/>
+                <a:hlinkClick r:id="rId3"/>
               </a:rPr>
               <a:t>http://</a:t>
             </a:r>
             <a:r>
               <a:rPr lang="en-US" sz="1000" dirty="0" smtClean="0">
-                <a:hlinkClick r:id="rId2"/>
+                <a:hlinkClick r:id="rId3"/>
               </a:rPr>
               <a:t>www.paratools.com/threadspotter</a:t>
             </a:r>
@@ -12932,13 +13326,13 @@
           <a:p>
             <a:r>
               <a:rPr lang="en-US" sz="1000" dirty="0">
-                <a:hlinkClick r:id="rId3" action="ppaction://hlinkfile"/>
+                <a:hlinkClick r:id="rId4" action="ppaction://hlinkfile"/>
               </a:rPr>
               <a:t>ftp://</a:t>
             </a:r>
             <a:r>
               <a:rPr lang="en-US" sz="1000" dirty="0" smtClean="0">
-                <a:hlinkClick r:id="rId3" action="ppaction://hlinkfile"/>
+                <a:hlinkClick r:id="rId4" action="ppaction://hlinkfile"/>
               </a:rPr>
               <a:t>ftp.paratools.com/threadspotter/documentation/ParaTools_TS_tutorial.pdf</a:t>
             </a:r>
@@ -13056,11 +13450,7 @@
             </a:pPr>
             <a:r>
               <a:rPr lang="en-US" dirty="0" smtClean="0"/>
-              <a:t>H</a:t>
-            </a:r>
-            <a:r>
-              <a:rPr lang="en-US" dirty="0" smtClean="0"/>
-              <a:t>elps to pinpoint where the program could be made to run faster </a:t>
+              <a:t>Helps to pinpoint where the program could be made to run faster </a:t>
             </a:r>
           </a:p>
           <a:p>
@@ -13297,11 +13687,7 @@
             </a:pPr>
             <a:r>
               <a:rPr lang="de-DE" dirty="0" smtClean="0"/>
-              <a:t>Different </a:t>
-            </a:r>
-            <a:r>
-              <a:rPr lang="de-DE" dirty="0" smtClean="0"/>
-              <a:t>Approaches</a:t>
+              <a:t>Different Approaches</a:t>
             </a:r>
           </a:p>
           <a:p>
@@ -13848,11 +14234,7 @@
           <a:p>
             <a:r>
               <a:rPr lang="de-DE" dirty="0" smtClean="0"/>
-              <a:t>Thread </a:t>
-            </a:r>
-            <a:r>
-              <a:rPr lang="de-DE" dirty="0" smtClean="0"/>
-              <a:t>Mapping</a:t>
+              <a:t>Thread Mapping</a:t>
             </a:r>
             <a:br>
               <a:rPr lang="de-DE" dirty="0" smtClean="0"/>
@@ -13897,14 +14279,29 @@
               <a:rPr lang="en-US" dirty="0"/>
               <a:t>The mapping performed by the operating system </a:t>
             </a:r>
-            <a:endParaRPr lang="en-US" dirty="0" smtClean="0"/>
           </a:p>
           <a:p>
             <a:pPr marL="701675" lvl="2" indent="-342900">
               <a:buFont typeface="Arial" charset="0"/>
               <a:buChar char="•"/>
             </a:pPr>
-            <a:endParaRPr lang="en-US" dirty="0"/>
+            <a:r>
+              <a:rPr lang="en-US" dirty="0" smtClean="0"/>
+              <a:t>Compact: </a:t>
+            </a:r>
+            <a:r>
+              <a:rPr lang="en-US" dirty="0"/>
+              <a:t>Neighboring threads are placed close to each other in the memory hierarchy ,</a:t>
+            </a:r>
+            <a:r>
+              <a:rPr lang="en-US" dirty="0" smtClean="0"/>
+              <a:t>a </a:t>
+            </a:r>
+            <a:r>
+              <a:rPr lang="en-US" dirty="0"/>
+              <a:t>round-robin scheduling of threads to PUs </a:t>
+            </a:r>
+            <a:endParaRPr lang="en-US" dirty="0" smtClean="0"/>
           </a:p>
           <a:p>
             <a:pPr marL="701675" lvl="2" indent="-342900">
@@ -13913,19 +14310,19 @@
             </a:pPr>
             <a:r>
               <a:rPr lang="en-US" dirty="0" smtClean="0"/>
-              <a:t>Compact: </a:t>
+              <a:t>Scatter: </a:t>
             </a:r>
             <a:r>
               <a:rPr lang="en-US" dirty="0"/>
-              <a:t>P</a:t>
+              <a:t>R</a:t>
             </a:r>
             <a:r>
               <a:rPr lang="en-US" dirty="0" smtClean="0"/>
-              <a:t>erforms </a:t>
+              <a:t>epresents </a:t>
             </a:r>
             <a:r>
               <a:rPr lang="en-US" dirty="0"/>
-              <a:t>a round-robin scheduling of threads to PUs </a:t>
+              <a:t>the opposite of Compact </a:t>
             </a:r>
             <a:endParaRPr lang="en-US" dirty="0" smtClean="0"/>
           </a:p>
@@ -13934,43 +14331,6 @@
               <a:buFont typeface="Arial" charset="0"/>
               <a:buChar char="•"/>
             </a:pPr>
-            <a:endParaRPr lang="en-US" dirty="0" smtClean="0"/>
-          </a:p>
-          <a:p>
-            <a:pPr marL="701675" lvl="2" indent="-342900">
-              <a:buFont typeface="Arial" charset="0"/>
-              <a:buChar char="•"/>
-            </a:pPr>
-            <a:r>
-              <a:rPr lang="en-US" dirty="0" smtClean="0"/>
-              <a:t>Scatter: </a:t>
-            </a:r>
-            <a:r>
-              <a:rPr lang="en-US" dirty="0"/>
-              <a:t>R</a:t>
-            </a:r>
-            <a:r>
-              <a:rPr lang="en-US" dirty="0" smtClean="0"/>
-              <a:t>epresents </a:t>
-            </a:r>
-            <a:r>
-              <a:rPr lang="en-US" dirty="0"/>
-              <a:t>the opposite of Compact </a:t>
-            </a:r>
-            <a:endParaRPr lang="en-US" dirty="0" smtClean="0"/>
-          </a:p>
-          <a:p>
-            <a:pPr marL="701675" lvl="2" indent="-342900">
-              <a:buFont typeface="Arial" charset="0"/>
-              <a:buChar char="•"/>
-            </a:pPr>
-            <a:endParaRPr lang="en-US" dirty="0" smtClean="0"/>
-          </a:p>
-          <a:p>
-            <a:pPr marL="701675" lvl="2" indent="-342900">
-              <a:buFont typeface="Arial" charset="0"/>
-              <a:buChar char="•"/>
-            </a:pPr>
             <a:r>
               <a:rPr lang="en-US" dirty="0" smtClean="0"/>
               <a:t>Locality: </a:t>
@@ -13991,13 +14351,6 @@
               <a:rPr lang="en-US" dirty="0" smtClean="0"/>
               <a:t>hierarchy </a:t>
             </a:r>
-          </a:p>
-          <a:p>
-            <a:pPr marL="701675" lvl="2" indent="-342900">
-              <a:buFont typeface="Arial" charset="0"/>
-              <a:buChar char="•"/>
-            </a:pPr>
-            <a:endParaRPr lang="en-US" dirty="0" smtClean="0"/>
           </a:p>
           <a:p>
             <a:pPr marL="701675" lvl="2" indent="-342900">
@@ -14133,11 +14486,7 @@
           <a:p>
             <a:r>
               <a:rPr lang="de-DE" dirty="0" smtClean="0"/>
-              <a:t>Thread </a:t>
-            </a:r>
-            <a:r>
-              <a:rPr lang="de-DE" dirty="0" smtClean="0"/>
-              <a:t>Mapping</a:t>
+              <a:t>Thread Mapping</a:t>
             </a:r>
             <a:br>
               <a:rPr lang="de-DE" dirty="0" smtClean="0"/>
@@ -26399,7 +26748,6 @@
               <a:rPr lang="en-US" dirty="0" smtClean="0"/>
               <a:t>Using synchronization primitives to find thread’s communication </a:t>
             </a:r>
-            <a:endParaRPr lang="en-US" dirty="0" smtClean="0"/>
           </a:p>
           <a:p>
             <a:pPr marL="701675" lvl="2" indent="-342900">
@@ -27350,13 +27698,6 @@
                     </a:rPr>
                     <a:t>6</a:t>
                   </a:r>
-                  <a:endParaRPr lang="en-US" dirty="0">
-                    <a:solidFill>
-                      <a:schemeClr val="accent6">
-                        <a:lumMod val="75000"/>
-                      </a:schemeClr>
-                    </a:solidFill>
-                  </a:endParaRPr>
                 </a:p>
               </p:txBody>
             </p:sp>
@@ -28107,7 +28448,6 @@
               <a:rPr lang="en-US" sz="1400" dirty="0"/>
               <a:t>Add Temporal information and extract time series</a:t>
             </a:r>
-            <a:endParaRPr lang="en-US" sz="1400" dirty="0"/>
           </a:p>
         </p:txBody>
       </p:sp>
@@ -28172,7 +28512,6 @@
               <a:rPr lang="en-US" sz="1400" dirty="0"/>
               <a:t>Thread Mapping</a:t>
             </a:r>
-            <a:endParaRPr lang="en-US" sz="1400" dirty="0"/>
           </a:p>
         </p:txBody>
       </p:sp>
@@ -28229,7 +28568,6 @@
               <a:rPr lang="en-US" sz="1400" dirty="0"/>
               <a:t>benchmarking</a:t>
             </a:r>
-            <a:endParaRPr lang="en-US" sz="1400" dirty="0"/>
           </a:p>
         </p:txBody>
       </p:sp>
@@ -28292,7 +28630,6 @@
               <a:rPr lang="en-US" sz="1400" dirty="0"/>
               <a:t>Buffer</a:t>
             </a:r>
-            <a:endParaRPr lang="en-US" sz="1400" dirty="0"/>
           </a:p>
         </p:txBody>
       </p:sp>
@@ -29998,7 +30335,6 @@
               <a:rPr lang="en-US" b="1" dirty="0" smtClean="0"/>
               <a:t>Profiling and instrumentation</a:t>
             </a:r>
-            <a:endParaRPr lang="en-US" b="1" dirty="0" smtClean="0"/>
           </a:p>
           <a:p>
             <a:pPr marL="701675" lvl="2" indent="-342900">
@@ -30009,7 +30345,6 @@
               <a:rPr lang="en-US" b="1" dirty="0" smtClean="0"/>
               <a:t>Thread Mapping</a:t>
             </a:r>
-            <a:endParaRPr lang="en-US" b="1" dirty="0" smtClean="0"/>
           </a:p>
           <a:p>
             <a:pPr marL="342900" lvl="1" indent="-342900">

</xml_diff>